<commit_message>
updated PairClassDiagram in DG
</commit_message>
<xml_diff>
--- a/docs/diagrams/PairClassDiagram.pptx
+++ b/docs/diagrams/PairClassDiagram.pptx
@@ -262,7 +262,7 @@
           <a:p>
             <a:fld id="{40C39A02-4836-4393-A3A4-9294DF1CF6ED}" type="datetimeFigureOut">
               <a:rPr lang="en-SG" smtClean="0"/>
-              <a:t>13/4/2018</a:t>
+              <a:t>14/4/2018</a:t>
             </a:fld>
             <a:endParaRPr lang="en-SG"/>
           </a:p>
@@ -462,7 +462,7 @@
           <a:p>
             <a:fld id="{40C39A02-4836-4393-A3A4-9294DF1CF6ED}" type="datetimeFigureOut">
               <a:rPr lang="en-SG" smtClean="0"/>
-              <a:t>13/4/2018</a:t>
+              <a:t>14/4/2018</a:t>
             </a:fld>
             <a:endParaRPr lang="en-SG"/>
           </a:p>
@@ -672,7 +672,7 @@
           <a:p>
             <a:fld id="{40C39A02-4836-4393-A3A4-9294DF1CF6ED}" type="datetimeFigureOut">
               <a:rPr lang="en-SG" smtClean="0"/>
-              <a:t>13/4/2018</a:t>
+              <a:t>14/4/2018</a:t>
             </a:fld>
             <a:endParaRPr lang="en-SG"/>
           </a:p>
@@ -872,7 +872,7 @@
           <a:p>
             <a:fld id="{40C39A02-4836-4393-A3A4-9294DF1CF6ED}" type="datetimeFigureOut">
               <a:rPr lang="en-SG" smtClean="0"/>
-              <a:t>13/4/2018</a:t>
+              <a:t>14/4/2018</a:t>
             </a:fld>
             <a:endParaRPr lang="en-SG"/>
           </a:p>
@@ -1148,7 +1148,7 @@
           <a:p>
             <a:fld id="{40C39A02-4836-4393-A3A4-9294DF1CF6ED}" type="datetimeFigureOut">
               <a:rPr lang="en-SG" smtClean="0"/>
-              <a:t>13/4/2018</a:t>
+              <a:t>14/4/2018</a:t>
             </a:fld>
             <a:endParaRPr lang="en-SG"/>
           </a:p>
@@ -1416,7 +1416,7 @@
           <a:p>
             <a:fld id="{40C39A02-4836-4393-A3A4-9294DF1CF6ED}" type="datetimeFigureOut">
               <a:rPr lang="en-SG" smtClean="0"/>
-              <a:t>13/4/2018</a:t>
+              <a:t>14/4/2018</a:t>
             </a:fld>
             <a:endParaRPr lang="en-SG"/>
           </a:p>
@@ -1831,7 +1831,7 @@
           <a:p>
             <a:fld id="{40C39A02-4836-4393-A3A4-9294DF1CF6ED}" type="datetimeFigureOut">
               <a:rPr lang="en-SG" smtClean="0"/>
-              <a:t>13/4/2018</a:t>
+              <a:t>14/4/2018</a:t>
             </a:fld>
             <a:endParaRPr lang="en-SG"/>
           </a:p>
@@ -1973,7 +1973,7 @@
           <a:p>
             <a:fld id="{40C39A02-4836-4393-A3A4-9294DF1CF6ED}" type="datetimeFigureOut">
               <a:rPr lang="en-SG" smtClean="0"/>
-              <a:t>13/4/2018</a:t>
+              <a:t>14/4/2018</a:t>
             </a:fld>
             <a:endParaRPr lang="en-SG"/>
           </a:p>
@@ -2086,7 +2086,7 @@
           <a:p>
             <a:fld id="{40C39A02-4836-4393-A3A4-9294DF1CF6ED}" type="datetimeFigureOut">
               <a:rPr lang="en-SG" smtClean="0"/>
-              <a:t>13/4/2018</a:t>
+              <a:t>14/4/2018</a:t>
             </a:fld>
             <a:endParaRPr lang="en-SG"/>
           </a:p>
@@ -2399,7 +2399,7 @@
           <a:p>
             <a:fld id="{40C39A02-4836-4393-A3A4-9294DF1CF6ED}" type="datetimeFigureOut">
               <a:rPr lang="en-SG" smtClean="0"/>
-              <a:t>13/4/2018</a:t>
+              <a:t>14/4/2018</a:t>
             </a:fld>
             <a:endParaRPr lang="en-SG"/>
           </a:p>
@@ -2688,7 +2688,7 @@
           <a:p>
             <a:fld id="{40C39A02-4836-4393-A3A4-9294DF1CF6ED}" type="datetimeFigureOut">
               <a:rPr lang="en-SG" smtClean="0"/>
-              <a:t>13/4/2018</a:t>
+              <a:t>14/4/2018</a:t>
             </a:fld>
             <a:endParaRPr lang="en-SG"/>
           </a:p>
@@ -2931,7 +2931,7 @@
           <a:p>
             <a:fld id="{40C39A02-4836-4393-A3A4-9294DF1CF6ED}" type="datetimeFigureOut">
               <a:rPr lang="en-SG" smtClean="0"/>
-              <a:t>13/4/2018</a:t>
+              <a:t>14/4/2018</a:t>
             </a:fld>
             <a:endParaRPr lang="en-SG"/>
           </a:p>
@@ -4858,7 +4858,7 @@
         <p:spPr>
           <a:xfrm>
             <a:off x="6848338" y="864492"/>
-            <a:ext cx="5020007" cy="2441960"/>
+            <a:ext cx="5020007" cy="1521356"/>
           </a:xfrm>
           <a:prstGeom prst="rect">
             <a:avLst/>
@@ -5119,8 +5119,8 @@
         </p:nvSpPr>
         <p:spPr>
           <a:xfrm>
-            <a:off x="6848337" y="3306452"/>
-            <a:ext cx="5020007" cy="2441960"/>
+            <a:off x="6848337" y="2385848"/>
+            <a:ext cx="5020007" cy="2102412"/>
           </a:xfrm>
           <a:prstGeom prst="rect">
             <a:avLst/>
@@ -5325,7 +5325,7 @@
               <a:defRPr/>
             </a:pPr>
             <a:r>
-              <a:rPr lang="en-SG" sz="1400" dirty="0">
+              <a:rPr lang="en-SG" sz="1400" u="sng" dirty="0">
                 <a:solidFill>
                   <a:prstClr val="white"/>
                 </a:solidFill>
@@ -5334,23 +5334,81 @@
               <a:t>+ </a:t>
             </a:r>
             <a:r>
-              <a:rPr lang="en-SG" sz="1400" dirty="0" err="1">
+              <a:rPr lang="en-SG" sz="1400" u="sng" dirty="0" err="1">
                 <a:solidFill>
                   <a:prstClr val="white"/>
                 </a:solidFill>
                 <a:latin typeface="Calibri" panose="020F0502020204030204"/>
               </a:rPr>
-              <a:t>toString</a:t>
-            </a:r>
-            <a:r>
-              <a:rPr lang="en-SG" sz="1400" dirty="0">
+              <a:t>getDefaultPairHashSet</a:t>
+            </a:r>
+            <a:r>
+              <a:rPr lang="en-SG" sz="1400" u="sng" dirty="0">
                 <a:solidFill>
                   <a:prstClr val="white"/>
                 </a:solidFill>
                 <a:latin typeface="Calibri" panose="020F0502020204030204"/>
               </a:rPr>
-              <a:t>() : String</a:t>
-            </a:r>
+              <a:t>() : Set&lt;</a:t>
+            </a:r>
+            <a:r>
+              <a:rPr lang="en-SG" sz="1400" u="sng" dirty="0" err="1">
+                <a:solidFill>
+                  <a:prstClr val="white"/>
+                </a:solidFill>
+                <a:latin typeface="Calibri" panose="020F0502020204030204"/>
+              </a:rPr>
+              <a:t>PairHash</a:t>
+            </a:r>
+            <a:r>
+              <a:rPr lang="en-SG" sz="1400" u="sng" dirty="0">
+                <a:solidFill>
+                  <a:prstClr val="white"/>
+                </a:solidFill>
+                <a:latin typeface="Calibri" panose="020F0502020204030204"/>
+              </a:rPr>
+              <a:t>&gt;</a:t>
+            </a:r>
+          </a:p>
+          <a:p>
+            <a:pPr algn="ctr"/>
+            <a:r>
+              <a:rPr lang="en-SG" sz="1400" u="sng" dirty="0">
+                <a:solidFill>
+                  <a:prstClr val="white"/>
+                </a:solidFill>
+              </a:rPr>
+              <a:t>+ </a:t>
+            </a:r>
+            <a:r>
+              <a:rPr lang="en-SG" sz="1400" u="sng" dirty="0" err="1">
+                <a:solidFill>
+                  <a:prstClr val="white"/>
+                </a:solidFill>
+              </a:rPr>
+              <a:t>isValidPairHash</a:t>
+            </a:r>
+            <a:r>
+              <a:rPr lang="en-SG" sz="1400" u="sng" dirty="0">
+                <a:solidFill>
+                  <a:prstClr val="white"/>
+                </a:solidFill>
+              </a:rPr>
+              <a:t>(String) : </a:t>
+            </a:r>
+            <a:r>
+              <a:rPr lang="en-SG" sz="1400" u="sng" dirty="0" err="1">
+                <a:solidFill>
+                  <a:prstClr val="white"/>
+                </a:solidFill>
+              </a:rPr>
+              <a:t>boolean</a:t>
+            </a:r>
+            <a:endParaRPr lang="en-SG" sz="1400" u="sng" dirty="0">
+              <a:solidFill>
+                <a:prstClr val="white"/>
+              </a:solidFill>
+            </a:endParaRPr>
           </a:p>
           <a:p>
             <a:pPr marL="0" marR="0" lvl="0" indent="0" algn="ctr" defTabSz="914400" rtl="0" eaLnBrk="1" fontAlgn="auto" latinLnBrk="0" hangingPunct="1">
@@ -5370,199 +5428,6 @@
               <a:tabLst/>
               <a:defRPr/>
             </a:pPr>
-            <a:r>
-              <a:rPr lang="en-SG" sz="1400" dirty="0">
-                <a:solidFill>
-                  <a:prstClr val="white"/>
-                </a:solidFill>
-                <a:latin typeface="Calibri" panose="020F0502020204030204"/>
-              </a:rPr>
-              <a:t>+ equals(Object) : Boolean</a:t>
-            </a:r>
-          </a:p>
-          <a:p>
-            <a:pPr marL="0" marR="0" lvl="0" indent="0" algn="ctr" defTabSz="914400" rtl="0" eaLnBrk="1" fontAlgn="auto" latinLnBrk="0" hangingPunct="1">
-              <a:lnSpc>
-                <a:spcPct val="100000"/>
-              </a:lnSpc>
-              <a:spcBef>
-                <a:spcPts val="0"/>
-              </a:spcBef>
-              <a:spcAft>
-                <a:spcPts val="0"/>
-              </a:spcAft>
-              <a:buClrTx/>
-              <a:buSzTx/>
-              <a:buFontTx/>
-              <a:buNone/>
-              <a:tabLst/>
-              <a:defRPr/>
-            </a:pPr>
-            <a:r>
-              <a:rPr lang="en-SG" sz="1400" dirty="0">
-                <a:solidFill>
-                  <a:prstClr val="white"/>
-                </a:solidFill>
-                <a:latin typeface="Calibri" panose="020F0502020204030204"/>
-              </a:rPr>
-              <a:t>+ </a:t>
-            </a:r>
-            <a:r>
-              <a:rPr lang="en-SG" sz="1400" dirty="0" err="1">
-                <a:solidFill>
-                  <a:prstClr val="white"/>
-                </a:solidFill>
-                <a:latin typeface="Calibri" panose="020F0502020204030204"/>
-              </a:rPr>
-              <a:t>getValue</a:t>
-            </a:r>
-            <a:r>
-              <a:rPr lang="en-SG" sz="1400" dirty="0">
-                <a:solidFill>
-                  <a:prstClr val="white"/>
-                </a:solidFill>
-                <a:latin typeface="Calibri" panose="020F0502020204030204"/>
-              </a:rPr>
-              <a:t>() :</a:t>
-            </a:r>
-            <a:r>
-              <a:rPr lang="en-SG" sz="1400" dirty="0" err="1">
-                <a:solidFill>
-                  <a:prstClr val="white"/>
-                </a:solidFill>
-                <a:latin typeface="Calibri" panose="020F0502020204030204"/>
-              </a:rPr>
-              <a:t>int</a:t>
-            </a:r>
-            <a:endParaRPr lang="en-SG" sz="1400" dirty="0">
-              <a:solidFill>
-                <a:prstClr val="white"/>
-              </a:solidFill>
-              <a:latin typeface="Calibri" panose="020F0502020204030204"/>
-            </a:endParaRPr>
-          </a:p>
-          <a:p>
-            <a:pPr marL="0" marR="0" lvl="0" indent="0" algn="ctr" defTabSz="914400" rtl="0" eaLnBrk="1" fontAlgn="auto" latinLnBrk="0" hangingPunct="1">
-              <a:lnSpc>
-                <a:spcPct val="100000"/>
-              </a:lnSpc>
-              <a:spcBef>
-                <a:spcPts val="0"/>
-              </a:spcBef>
-              <a:spcAft>
-                <a:spcPts val="0"/>
-              </a:spcAft>
-              <a:buClrTx/>
-              <a:buSzTx/>
-              <a:buFontTx/>
-              <a:buNone/>
-              <a:tabLst/>
-              <a:defRPr/>
-            </a:pPr>
-            <a:r>
-              <a:rPr lang="en-SG" sz="1400" u="sng" dirty="0">
-                <a:solidFill>
-                  <a:prstClr val="white"/>
-                </a:solidFill>
-                <a:latin typeface="Calibri" panose="020F0502020204030204"/>
-              </a:rPr>
-              <a:t>+ </a:t>
-            </a:r>
-            <a:r>
-              <a:rPr lang="en-SG" sz="1400" u="sng" dirty="0" err="1">
-                <a:solidFill>
-                  <a:prstClr val="white"/>
-                </a:solidFill>
-                <a:latin typeface="Calibri" panose="020F0502020204030204"/>
-              </a:rPr>
-              <a:t>getDefaultPairHashSet</a:t>
-            </a:r>
-            <a:r>
-              <a:rPr lang="en-SG" sz="1400" u="sng" dirty="0">
-                <a:solidFill>
-                  <a:prstClr val="white"/>
-                </a:solidFill>
-                <a:latin typeface="Calibri" panose="020F0502020204030204"/>
-              </a:rPr>
-              <a:t>() : Set&lt;</a:t>
-            </a:r>
-            <a:r>
-              <a:rPr lang="en-SG" sz="1400" u="sng" dirty="0" err="1">
-                <a:solidFill>
-                  <a:prstClr val="white"/>
-                </a:solidFill>
-                <a:latin typeface="Calibri" panose="020F0502020204030204"/>
-              </a:rPr>
-              <a:t>PairHash</a:t>
-            </a:r>
-            <a:r>
-              <a:rPr lang="en-SG" sz="1400" u="sng" dirty="0">
-                <a:solidFill>
-                  <a:prstClr val="white"/>
-                </a:solidFill>
-                <a:latin typeface="Calibri" panose="020F0502020204030204"/>
-              </a:rPr>
-              <a:t>&gt;</a:t>
-            </a:r>
-          </a:p>
-          <a:p>
-            <a:pPr algn="ctr"/>
-            <a:r>
-              <a:rPr lang="en-SG" sz="1400" u="sng" dirty="0">
-                <a:solidFill>
-                  <a:prstClr val="white"/>
-                </a:solidFill>
-              </a:rPr>
-              <a:t>+ </a:t>
-            </a:r>
-            <a:r>
-              <a:rPr lang="en-SG" sz="1400" u="sng" dirty="0" err="1">
-                <a:solidFill>
-                  <a:prstClr val="white"/>
-                </a:solidFill>
-              </a:rPr>
-              <a:t>isValidPairHash</a:t>
-            </a:r>
-            <a:r>
-              <a:rPr lang="en-SG" sz="1400" u="sng" dirty="0">
-                <a:solidFill>
-                  <a:prstClr val="white"/>
-                </a:solidFill>
-              </a:rPr>
-              <a:t>(String) : </a:t>
-            </a:r>
-            <a:r>
-              <a:rPr lang="en-SG" sz="1400" u="sng" dirty="0" err="1">
-                <a:solidFill>
-                  <a:prstClr val="white"/>
-                </a:solidFill>
-              </a:rPr>
-              <a:t>boolean</a:t>
-            </a:r>
-            <a:endParaRPr lang="en-SG" sz="1400" u="sng" dirty="0">
-              <a:solidFill>
-                <a:prstClr val="white"/>
-              </a:solidFill>
-            </a:endParaRPr>
-          </a:p>
-          <a:p>
-            <a:pPr marL="0" marR="0" lvl="0" indent="0" algn="ctr" defTabSz="914400" rtl="0" eaLnBrk="1" fontAlgn="auto" latinLnBrk="0" hangingPunct="1">
-              <a:lnSpc>
-                <a:spcPct val="100000"/>
-              </a:lnSpc>
-              <a:spcBef>
-                <a:spcPts val="0"/>
-              </a:spcBef>
-              <a:spcAft>
-                <a:spcPts val="0"/>
-              </a:spcAft>
-              <a:buClrTx/>
-              <a:buSzTx/>
-              <a:buFontTx/>
-              <a:buNone/>
-              <a:tabLst/>
-              <a:defRPr/>
-            </a:pPr>
             <a:endParaRPr lang="en-SG" u="sng" dirty="0">
               <a:solidFill>
                 <a:prstClr val="white"/>
@@ -5586,8 +5451,8 @@
         </p:nvSpPr>
         <p:spPr>
           <a:xfrm>
-            <a:off x="704941" y="3281886"/>
-            <a:ext cx="3922520" cy="3273024"/>
+            <a:off x="692147" y="3303249"/>
+            <a:ext cx="3922520" cy="1185011"/>
           </a:xfrm>
           <a:prstGeom prst="rect">
             <a:avLst/>
@@ -5660,7 +5525,7 @@
               <a:tabLst/>
               <a:defRPr/>
             </a:pPr>
-            <a:endParaRPr lang="en-SG" sz="1400" dirty="0">
+            <a:endParaRPr lang="en-SG" sz="1400" u="sng" dirty="0">
               <a:solidFill>
                 <a:prstClr val="white"/>
               </a:solidFill>
@@ -5864,299 +5729,6 @@
                 </a:solidFill>
               </a:rPr>
               <a:t>+ Pair (Person, Person, Subject, Level, Price)</a:t>
-            </a:r>
-          </a:p>
-          <a:p>
-            <a:pPr marR="0" lvl="0" algn="ctr" defTabSz="914400" rtl="0" eaLnBrk="1" fontAlgn="auto" latinLnBrk="0" hangingPunct="1">
-              <a:lnSpc>
-                <a:spcPct val="100000"/>
-              </a:lnSpc>
-              <a:spcBef>
-                <a:spcPts val="0"/>
-              </a:spcBef>
-              <a:spcAft>
-                <a:spcPts val="0"/>
-              </a:spcAft>
-              <a:buClrTx/>
-              <a:buSzTx/>
-              <a:tabLst/>
-              <a:defRPr/>
-            </a:pPr>
-            <a:r>
-              <a:rPr lang="en-SG" sz="1400" dirty="0">
-                <a:solidFill>
-                  <a:prstClr val="white"/>
-                </a:solidFill>
-              </a:rPr>
-              <a:t>+ </a:t>
-            </a:r>
-            <a:r>
-              <a:rPr lang="en-SG" sz="1400" dirty="0" err="1">
-                <a:solidFill>
-                  <a:prstClr val="white"/>
-                </a:solidFill>
-              </a:rPr>
-              <a:t>getStudentName</a:t>
-            </a:r>
-            <a:r>
-              <a:rPr lang="en-SG" sz="1400" dirty="0">
-                <a:solidFill>
-                  <a:prstClr val="white"/>
-                </a:solidFill>
-              </a:rPr>
-              <a:t>() : String</a:t>
-            </a:r>
-          </a:p>
-          <a:p>
-            <a:pPr algn="ctr"/>
-            <a:r>
-              <a:rPr lang="en-SG" sz="1400" dirty="0">
-                <a:solidFill>
-                  <a:prstClr val="white"/>
-                </a:solidFill>
-              </a:rPr>
-              <a:t>+ </a:t>
-            </a:r>
-            <a:r>
-              <a:rPr lang="en-SG" sz="1400" dirty="0" err="1">
-                <a:solidFill>
-                  <a:prstClr val="white"/>
-                </a:solidFill>
-              </a:rPr>
-              <a:t>getTutorName</a:t>
-            </a:r>
-            <a:r>
-              <a:rPr lang="en-SG" sz="1400" dirty="0">
-                <a:solidFill>
-                  <a:prstClr val="white"/>
-                </a:solidFill>
-              </a:rPr>
-              <a:t>() : String</a:t>
-            </a:r>
-          </a:p>
-          <a:p>
-            <a:pPr algn="ctr"/>
-            <a:r>
-              <a:rPr lang="en-SG" sz="1400" dirty="0">
-                <a:solidFill>
-                  <a:prstClr val="white"/>
-                </a:solidFill>
-              </a:rPr>
-              <a:t>+ </a:t>
-            </a:r>
-            <a:r>
-              <a:rPr lang="en-SG" sz="1400" dirty="0" err="1">
-                <a:solidFill>
-                  <a:prstClr val="white"/>
-                </a:solidFill>
-              </a:rPr>
-              <a:t>getSubject</a:t>
-            </a:r>
-            <a:r>
-              <a:rPr lang="en-SG" sz="1400" dirty="0">
-                <a:solidFill>
-                  <a:prstClr val="white"/>
-                </a:solidFill>
-              </a:rPr>
-              <a:t>() : String</a:t>
-            </a:r>
-          </a:p>
-          <a:p>
-            <a:pPr algn="ctr"/>
-            <a:r>
-              <a:rPr lang="en-SG" sz="1400" dirty="0">
-                <a:solidFill>
-                  <a:prstClr val="white"/>
-                </a:solidFill>
-              </a:rPr>
-              <a:t>+ </a:t>
-            </a:r>
-            <a:r>
-              <a:rPr lang="en-SG" sz="1400" dirty="0" err="1">
-                <a:solidFill>
-                  <a:prstClr val="white"/>
-                </a:solidFill>
-              </a:rPr>
-              <a:t>getLevel</a:t>
-            </a:r>
-            <a:r>
-              <a:rPr lang="en-SG" sz="1400" dirty="0">
-                <a:solidFill>
-                  <a:prstClr val="white"/>
-                </a:solidFill>
-              </a:rPr>
-              <a:t>() : String</a:t>
-            </a:r>
-          </a:p>
-          <a:p>
-            <a:pPr algn="ctr"/>
-            <a:r>
-              <a:rPr lang="en-SG" sz="1400" dirty="0">
-                <a:solidFill>
-                  <a:prstClr val="white"/>
-                </a:solidFill>
-              </a:rPr>
-              <a:t>+ </a:t>
-            </a:r>
-            <a:r>
-              <a:rPr lang="en-SG" sz="1400" dirty="0" err="1">
-                <a:solidFill>
-                  <a:prstClr val="white"/>
-                </a:solidFill>
-              </a:rPr>
-              <a:t>getPrice</a:t>
-            </a:r>
-            <a:r>
-              <a:rPr lang="en-SG" sz="1400" dirty="0">
-                <a:solidFill>
-                  <a:prstClr val="white"/>
-                </a:solidFill>
-              </a:rPr>
-              <a:t>() : String</a:t>
-            </a:r>
-          </a:p>
-          <a:p>
-            <a:pPr algn="ctr"/>
-            <a:r>
-              <a:rPr lang="en-SG" sz="1400" dirty="0">
-                <a:solidFill>
-                  <a:prstClr val="white"/>
-                </a:solidFill>
-              </a:rPr>
-              <a:t>+ </a:t>
-            </a:r>
-            <a:r>
-              <a:rPr lang="en-SG" sz="1400" dirty="0" err="1">
-                <a:solidFill>
-                  <a:prstClr val="white"/>
-                </a:solidFill>
-              </a:rPr>
-              <a:t>getPairName</a:t>
-            </a:r>
-            <a:r>
-              <a:rPr lang="en-SG" sz="1400" dirty="0">
-                <a:solidFill>
-                  <a:prstClr val="white"/>
-                </a:solidFill>
-              </a:rPr>
-              <a:t>() : String</a:t>
-            </a:r>
-          </a:p>
-          <a:p>
-            <a:pPr algn="ctr"/>
-            <a:r>
-              <a:rPr lang="en-SG" sz="1400" dirty="0">
-                <a:solidFill>
-                  <a:prstClr val="white"/>
-                </a:solidFill>
-              </a:rPr>
-              <a:t>+ </a:t>
-            </a:r>
-            <a:r>
-              <a:rPr lang="en-SG" sz="1400" dirty="0" err="1">
-                <a:solidFill>
-                  <a:prstClr val="white"/>
-                </a:solidFill>
-              </a:rPr>
-              <a:t>getPairHash</a:t>
-            </a:r>
-            <a:r>
-              <a:rPr lang="en-SG" sz="1400" dirty="0">
-                <a:solidFill>
-                  <a:prstClr val="white"/>
-                </a:solidFill>
-              </a:rPr>
-              <a:t>() : </a:t>
-            </a:r>
-            <a:r>
-              <a:rPr lang="en-SG" sz="1400" dirty="0" err="1">
-                <a:solidFill>
-                  <a:prstClr val="white"/>
-                </a:solidFill>
-              </a:rPr>
-              <a:t>PairHash</a:t>
-            </a:r>
-            <a:endParaRPr lang="en-SG" sz="1400" dirty="0">
-              <a:solidFill>
-                <a:prstClr val="white"/>
-              </a:solidFill>
-            </a:endParaRPr>
-          </a:p>
-          <a:p>
-            <a:pPr algn="ctr"/>
-            <a:r>
-              <a:rPr lang="en-SG" sz="1400" dirty="0">
-                <a:solidFill>
-                  <a:prstClr val="white"/>
-                </a:solidFill>
-              </a:rPr>
-              <a:t>+ </a:t>
-            </a:r>
-            <a:r>
-              <a:rPr lang="en-SG" sz="1400" dirty="0" err="1">
-                <a:solidFill>
-                  <a:prstClr val="white"/>
-                </a:solidFill>
-              </a:rPr>
-              <a:t>getTags</a:t>
-            </a:r>
-            <a:r>
-              <a:rPr lang="en-SG" sz="1400" dirty="0">
-                <a:solidFill>
-                  <a:prstClr val="white"/>
-                </a:solidFill>
-              </a:rPr>
-              <a:t> : </a:t>
-            </a:r>
-            <a:r>
-              <a:rPr lang="en-SG" sz="1400" u="sng" dirty="0">
-                <a:solidFill>
-                  <a:prstClr val="white"/>
-                </a:solidFill>
-              </a:rPr>
-              <a:t>Set&lt;Tag&gt;</a:t>
-            </a:r>
-          </a:p>
-          <a:p>
-            <a:pPr lvl="0" algn="ctr">
-              <a:defRPr/>
-            </a:pPr>
-            <a:r>
-              <a:rPr lang="en-SG" sz="1400" dirty="0">
-                <a:solidFill>
-                  <a:prstClr val="white"/>
-                </a:solidFill>
-              </a:rPr>
-              <a:t>+ </a:t>
-            </a:r>
-            <a:r>
-              <a:rPr lang="en-SG" sz="1400" dirty="0" err="1">
-                <a:solidFill>
-                  <a:prstClr val="white"/>
-                </a:solidFill>
-              </a:rPr>
-              <a:t>toString</a:t>
-            </a:r>
-            <a:r>
-              <a:rPr lang="en-SG" sz="1400" dirty="0">
-                <a:solidFill>
-                  <a:prstClr val="white"/>
-                </a:solidFill>
-              </a:rPr>
-              <a:t>() : String</a:t>
-            </a:r>
-          </a:p>
-          <a:p>
-            <a:pPr lvl="0" algn="ctr">
-              <a:defRPr/>
-            </a:pPr>
-            <a:r>
-              <a:rPr lang="en-SG" sz="1400" dirty="0">
-                <a:solidFill>
-                  <a:prstClr val="white"/>
-                </a:solidFill>
-              </a:rPr>
-              <a:t>+ equals(Object) : Boolean</a:t>
             </a:r>
           </a:p>
           <a:p>

</xml_diff>